<commit_message>
add slide data QGIS tutorial
</commit_message>
<xml_diff>
--- a/lab_day2.pptx
+++ b/lab_day2.pptx
@@ -6294,8 +6294,8 @@
           </a:prstGeom>
         </p:spPr>
       </p:pic>
-      <mc:AlternateContent xmlns:mc="http://schemas.openxmlformats.org/markup-compatibility/2006">
-        <mc:Choice xmlns:a14="http://schemas.microsoft.com/office/drawing/2010/main" Requires="a14">
+      <mc:AlternateContent xmlns:mc="http://schemas.openxmlformats.org/markup-compatibility/2006" xmlns:a14="http://schemas.microsoft.com/office/drawing/2010/main">
+        <mc:Choice Requires="a14">
           <p:sp>
             <p:nvSpPr>
               <p:cNvPr id="5" name="Content Placeholder 2">
@@ -6618,7 +6618,7 @@
             </p:txBody>
           </p:sp>
         </mc:Choice>
-        <mc:Fallback>
+        <mc:Fallback xmlns="">
           <p:sp>
             <p:nvSpPr>
               <p:cNvPr id="5" name="Content Placeholder 2">
@@ -6663,8 +6663,8 @@
           </p:sp>
         </mc:Fallback>
       </mc:AlternateContent>
-      <mc:AlternateContent xmlns:mc="http://schemas.openxmlformats.org/markup-compatibility/2006">
-        <mc:Choice xmlns:a14="http://schemas.microsoft.com/office/drawing/2010/main" Requires="a14">
+      <mc:AlternateContent xmlns:mc="http://schemas.openxmlformats.org/markup-compatibility/2006" xmlns:a14="http://schemas.microsoft.com/office/drawing/2010/main">
+        <mc:Choice Requires="a14">
           <p:sp>
             <p:nvSpPr>
               <p:cNvPr id="6" name="Rectangle 5">
@@ -6743,7 +6743,7 @@
             </p:txBody>
           </p:sp>
         </mc:Choice>
-        <mc:Fallback>
+        <mc:Fallback xmlns="">
           <p:sp>
             <p:nvSpPr>
               <p:cNvPr id="6" name="Rectangle 5">
@@ -15943,14 +15943,113 @@
         </p:blipFill>
         <p:spPr>
           <a:xfrm>
-            <a:off x="3459339" y="1783644"/>
-            <a:ext cx="5273322" cy="4468917"/>
+            <a:off x="4042322" y="3012066"/>
+            <a:ext cx="4107355" cy="3480809"/>
           </a:xfrm>
           <a:prstGeom prst="rect">
             <a:avLst/>
           </a:prstGeom>
         </p:spPr>
       </p:pic>
+      <p:sp>
+        <p:nvSpPr>
+          <p:cNvPr id="3" name="Rectangle 2">
+            <a:extLst>
+              <a:ext uri="{FF2B5EF4-FFF2-40B4-BE49-F238E27FC236}">
+                <a16:creationId xmlns:a16="http://schemas.microsoft.com/office/drawing/2014/main" id="{59EC12C9-6437-9044-865B-1A520274798D}"/>
+              </a:ext>
+            </a:extLst>
+          </p:cNvPr>
+          <p:cNvSpPr/>
+          <p:nvPr/>
+        </p:nvSpPr>
+        <p:spPr>
+          <a:xfrm>
+            <a:off x="838200" y="1690688"/>
+            <a:ext cx="7894460" cy="967957"/>
+          </a:xfrm>
+          <a:prstGeom prst="rect">
+            <a:avLst/>
+          </a:prstGeom>
+        </p:spPr>
+        <p:txBody>
+          <a:bodyPr wrap="square">
+            <a:spAutoFit/>
+          </a:bodyPr>
+          <a:lstStyle/>
+          <a:p>
+            <a:pPr marL="285750" indent="-285750">
+              <a:lnSpc>
+                <a:spcPct val="150000"/>
+              </a:lnSpc>
+              <a:buFont typeface="Arial" panose="020B0604020202020204" pitchFamily="34" charset="0"/>
+              <a:buChar char="•"/>
+            </a:pPr>
+            <a:r>
+              <a:rPr lang="en-US" sz="2000" b="1" dirty="0">
+                <a:latin typeface="Calibri" panose="020F0502020204030204" pitchFamily="34" charset="0"/>
+                <a:ea typeface="DengXian" panose="02010600030101010101" pitchFamily="2" charset="-122"/>
+                <a:cs typeface="Times New Roman" panose="02020603050405020304" pitchFamily="18" charset="0"/>
+              </a:rPr>
+              <a:t>Git clone the repository: </a:t>
+            </a:r>
+            <a:r>
+              <a:rPr lang="en-US" sz="2000" b="1" u="sng" dirty="0">
+                <a:solidFill>
+                  <a:srgbClr val="0563C1"/>
+                </a:solidFill>
+                <a:latin typeface="Calibri" panose="020F0502020204030204" pitchFamily="34" charset="0"/>
+                <a:ea typeface="DengXian" panose="02010600030101010101" pitchFamily="2" charset="-122"/>
+                <a:cs typeface="Times New Roman" panose="02020603050405020304" pitchFamily="18" charset="0"/>
+                <a:hlinkClick r:id="rId3"/>
+              </a:rPr>
+              <a:t>https://github.com/linyijun/lab201907.git</a:t>
+            </a:r>
+            <a:endParaRPr lang="en-US" sz="2000" b="1" u="sng" dirty="0">
+              <a:solidFill>
+                <a:srgbClr val="0563C1"/>
+              </a:solidFill>
+              <a:latin typeface="Calibri" panose="020F0502020204030204" pitchFamily="34" charset="0"/>
+              <a:ea typeface="DengXian" panose="02010600030101010101" pitchFamily="2" charset="-122"/>
+              <a:cs typeface="Times New Roman" panose="02020603050405020304" pitchFamily="18" charset="0"/>
+            </a:endParaRPr>
+          </a:p>
+          <a:p>
+            <a:pPr marL="285750" indent="-285750">
+              <a:lnSpc>
+                <a:spcPct val="150000"/>
+              </a:lnSpc>
+              <a:buFont typeface="Arial" panose="020B0604020202020204" pitchFamily="34" charset="0"/>
+              <a:buChar char="•"/>
+            </a:pPr>
+            <a:r>
+              <a:rPr lang="en-US" sz="2000" b="1" dirty="0">
+                <a:latin typeface="Calibri" panose="020F0502020204030204" pitchFamily="34" charset="0"/>
+                <a:ea typeface="DengXian" panose="02010600030101010101" pitchFamily="2" charset="-122"/>
+                <a:cs typeface="Times New Roman" panose="02020603050405020304" pitchFamily="18" charset="0"/>
+              </a:rPr>
+              <a:t>Follow the Tutorial  &lt;</a:t>
+            </a:r>
+            <a:r>
+              <a:rPr lang="en-US" sz="2000" b="1" dirty="0" err="1">
+                <a:latin typeface="Calibri" panose="020F0502020204030204" pitchFamily="34" charset="0"/>
+                <a:ea typeface="DengXian" panose="02010600030101010101" pitchFamily="2" charset="-122"/>
+                <a:cs typeface="Times New Roman" panose="02020603050405020304" pitchFamily="18" charset="0"/>
+              </a:rPr>
+              <a:t>recommendation_system_tutorial</a:t>
+            </a:r>
+            <a:r>
+              <a:rPr lang="en-US" sz="2000" b="1" dirty="0">
+                <a:latin typeface="Calibri" panose="020F0502020204030204" pitchFamily="34" charset="0"/>
+                <a:ea typeface="DengXian" panose="02010600030101010101" pitchFamily="2" charset="-122"/>
+                <a:cs typeface="Times New Roman" panose="02020603050405020304" pitchFamily="18" charset="0"/>
+              </a:rPr>
+              <a:t> _part_1.docx&gt;</a:t>
+            </a:r>
+            <a:endParaRPr lang="en-US" sz="2000" b="1" dirty="0"/>
+          </a:p>
+        </p:txBody>
+      </p:sp>
     </p:spTree>
     <p:extLst>
       <p:ext uri="{BB962C8B-B14F-4D97-AF65-F5344CB8AC3E}">

</xml_diff>